<commit_message>
fixing mip nexp defs
</commit_message>
<xml_diff>
--- a/Lectures/Chto_vozmozhno_vychislit_v2.pptx
+++ b/Lectures/Chto_vozmozhno_vychislit_v2.pptx
@@ -8324,16 +8324,22 @@
           </a:xfrm>
         </p:spPr>
         <p:txBody>
-          <a:bodyPr/>
+          <a:bodyPr>
+            <a:normAutofit lnSpcReduction="10000"/>
+          </a:bodyPr>
           <a:lstStyle/>
           <a:p>
             <a:r>
               <a:rPr lang="en-US" dirty="0" smtClean="0"/>
-              <a:t>NEXP</a:t>
-            </a:r>
-            <a:r>
-              <a:rPr lang="ru-RU" dirty="0" smtClean="0"/>
-              <a:t> – Класс задач, вычислительно проверяемых (в концепции интерактивных доказательств</a:t>
+              <a:t>MIP </a:t>
+            </a:r>
+            <a:r>
+              <a:rPr lang="ru-RU" dirty="0" smtClean="0"/>
+              <a:t>– </a:t>
+            </a:r>
+            <a:r>
+              <a:rPr lang="ru-RU" dirty="0" smtClean="0"/>
+              <a:t>Класс задач, вычислительно проверяемых (в концепции интерактивных доказательств</a:t>
             </a:r>
             <a:r>
               <a:rPr lang="en-US" dirty="0" smtClean="0"/>
@@ -8341,19 +8347,31 @@
             </a:r>
             <a:r>
               <a:rPr lang="ru-RU" dirty="0" smtClean="0"/>
-              <a:t>с двумя доказывающими), т.е. те задачи, ответ на которые можно вычислительно проверить </a:t>
-            </a:r>
-            <a:r>
-              <a:rPr lang="ru-RU" smtClean="0"/>
-              <a:t>за </a:t>
-            </a:r>
-            <a:r>
-              <a:rPr lang="ru-RU" smtClean="0"/>
-              <a:t>экспоненциальное </a:t>
+              <a:t>с двумя доказывающими), т.е. те задачи, ответ на которые можно вычислительно проверить за </a:t>
+            </a:r>
+            <a:r>
+              <a:rPr lang="ru-RU" dirty="0" smtClean="0"/>
+              <a:t>полиномиальное </a:t>
             </a:r>
             <a:r>
               <a:rPr lang="ru-RU" dirty="0" smtClean="0"/>
               <a:t>время.</a:t>
+            </a:r>
+          </a:p>
+          <a:p>
+            <a:r>
+              <a:rPr lang="en-US" dirty="0" smtClean="0"/>
+              <a:t>NEXP – </a:t>
+            </a:r>
+            <a:r>
+              <a:rPr lang="ru-RU" dirty="0" smtClean="0"/>
+              <a:t>Класс задач, вычислительно проверяемых за экспоненциальное время</a:t>
+            </a:r>
+          </a:p>
+          <a:p>
+            <a:r>
+              <a:rPr lang="en-US" dirty="0" smtClean="0"/>
+              <a:t>NEXP = MIP</a:t>
             </a:r>
             <a:endParaRPr lang="ru-RU" dirty="0"/>
           </a:p>
@@ -8420,7 +8438,7 @@
             <a:pPr algn="ctr"/>
             <a:r>
               <a:rPr lang="en-US" dirty="0" smtClean="0"/>
-              <a:t>NEXP</a:t>
+              <a:t>MIP=NEXP</a:t>
             </a:r>
             <a:endParaRPr lang="ru-RU" dirty="0"/>
           </a:p>

</xml_diff>